<commit_message>
PPTs Aulas 2 a 8 Python 24/08/2022
</commit_message>
<xml_diff>
--- a/01 Classes/Aula 02 Programação Python - Variáveis e Expressões.pptx
+++ b/01 Classes/Aula 02 Programação Python - Variáveis e Expressões.pptx
@@ -10815,8 +10815,8 @@
         </p:nvSpPr>
         <p:spPr>
           <a:xfrm>
-            <a:off x="148605" y="1063231"/>
-            <a:ext cx="5242142" cy="2246765"/>
+            <a:off x="148604" y="1063231"/>
+            <a:ext cx="5550737" cy="2246765"/>
           </a:xfrm>
           <a:prstGeom prst="rect">
             <a:avLst/>
@@ -10871,27 +10871,7 @@
                 <a:latin typeface="Times New Roman" panose="02020603050405020304" pitchFamily="18" charset="0"/>
                 <a:cs typeface="Times New Roman" panose="02020603050405020304" pitchFamily="18" charset="0"/>
               </a:rPr>
-              <a:t>Variáveis/Identificadores (</a:t>
-            </a:r>
-            <a:r>
-              <a:rPr lang="pt-BR" sz="2000" b="1" dirty="0" err="1">
-                <a:solidFill>
-                  <a:srgbClr val="FF0000"/>
-                </a:solidFill>
-                <a:latin typeface="Times New Roman" panose="02020603050405020304" pitchFamily="18" charset="0"/>
-                <a:cs typeface="Times New Roman" panose="02020603050405020304" pitchFamily="18" charset="0"/>
-              </a:rPr>
-              <a:t>type</a:t>
-            </a:r>
-            <a:r>
-              <a:rPr lang="pt-BR" sz="2000" dirty="0">
-                <a:solidFill>
-                  <a:schemeClr val="tx1"/>
-                </a:solidFill>
-                <a:latin typeface="Times New Roman" panose="02020603050405020304" pitchFamily="18" charset="0"/>
-                <a:cs typeface="Times New Roman" panose="02020603050405020304" pitchFamily="18" charset="0"/>
-              </a:rPr>
-              <a:t>)</a:t>
+              <a:t>Variáveis/Identificadores</a:t>
             </a:r>
           </a:p>
           <a:p>
@@ -10916,7 +10896,17 @@
                 <a:latin typeface="Times New Roman" panose="02020603050405020304" pitchFamily="18" charset="0"/>
                 <a:cs typeface="Times New Roman" panose="02020603050405020304" pitchFamily="18" charset="0"/>
               </a:rPr>
-              <a:t>tipagem dinâmica</a:t>
+              <a:t>tipagem dinâmica - </a:t>
+            </a:r>
+            <a:r>
+              <a:rPr lang="pt-BR" sz="2000" b="1" dirty="0" err="1">
+                <a:solidFill>
+                  <a:srgbClr val="FF0000"/>
+                </a:solidFill>
+                <a:latin typeface="Times New Roman" panose="02020603050405020304" pitchFamily="18" charset="0"/>
+                <a:cs typeface="Times New Roman" panose="02020603050405020304" pitchFamily="18" charset="0"/>
+              </a:rPr>
+              <a:t>type</a:t>
             </a:r>
             <a:r>
               <a:rPr lang="pt-BR" sz="2000" dirty="0">
@@ -10941,12 +10931,22 @@
                 <a:latin typeface="Times New Roman" panose="02020603050405020304" pitchFamily="18" charset="0"/>
                 <a:cs typeface="Times New Roman" panose="02020603050405020304" pitchFamily="18" charset="0"/>
               </a:rPr>
-              <a:t>Estrutura de Dados: Listas, </a:t>
-            </a:r>
-            <a:r>
-              <a:rPr lang="pt-BR" sz="2000" dirty="0" err="1">
-                <a:solidFill>
-                  <a:schemeClr val="tx1"/>
+              <a:t>Estrutura de Dados: </a:t>
+            </a:r>
+            <a:r>
+              <a:rPr lang="pt-BR" sz="2000" b="1" dirty="0">
+                <a:solidFill>
+                  <a:srgbClr val="FF0000"/>
+                </a:solidFill>
+                <a:latin typeface="Times New Roman" panose="02020603050405020304" pitchFamily="18" charset="0"/>
+                <a:cs typeface="Times New Roman" panose="02020603050405020304" pitchFamily="18" charset="0"/>
+              </a:rPr>
+              <a:t>Listas, </a:t>
+            </a:r>
+            <a:r>
+              <a:rPr lang="pt-BR" sz="2000" b="1" dirty="0" err="1">
+                <a:solidFill>
+                  <a:srgbClr val="FF0000"/>
                 </a:solidFill>
                 <a:latin typeface="Times New Roman" panose="02020603050405020304" pitchFamily="18" charset="0"/>
                 <a:cs typeface="Times New Roman" panose="02020603050405020304" pitchFamily="18" charset="0"/>
@@ -10954,9 +10954,9 @@
               <a:t>Tuplas</a:t>
             </a:r>
             <a:r>
-              <a:rPr lang="pt-BR" sz="2000" dirty="0">
-                <a:solidFill>
-                  <a:schemeClr val="tx1"/>
+              <a:rPr lang="pt-BR" sz="2000" b="1" dirty="0">
+                <a:solidFill>
+                  <a:srgbClr val="FF0000"/>
                 </a:solidFill>
                 <a:latin typeface="Times New Roman" panose="02020603050405020304" pitchFamily="18" charset="0"/>
                 <a:cs typeface="Times New Roman" panose="02020603050405020304" pitchFamily="18" charset="0"/>
@@ -10964,9 +10964,9 @@
               <a:t>, </a:t>
             </a:r>
             <a:r>
-              <a:rPr lang="pt-BR" sz="2000" dirty="0" err="1">
-                <a:solidFill>
-                  <a:schemeClr val="tx1"/>
+              <a:rPr lang="pt-BR" sz="2000" b="1" dirty="0" err="1">
+                <a:solidFill>
+                  <a:srgbClr val="FF0000"/>
                 </a:solidFill>
                 <a:latin typeface="Times New Roman" panose="02020603050405020304" pitchFamily="18" charset="0"/>
                 <a:cs typeface="Times New Roman" panose="02020603050405020304" pitchFamily="18" charset="0"/>
@@ -10974,9 +10974,9 @@
               <a:t>Dics</a:t>
             </a:r>
             <a:r>
-              <a:rPr lang="pt-BR" sz="2000" dirty="0">
-                <a:solidFill>
-                  <a:schemeClr val="tx1"/>
+              <a:rPr lang="pt-BR" sz="2000" b="1" dirty="0">
+                <a:solidFill>
+                  <a:srgbClr val="FF0000"/>
                 </a:solidFill>
                 <a:latin typeface="Times New Roman" panose="02020603050405020304" pitchFamily="18" charset="0"/>
                 <a:cs typeface="Times New Roman" panose="02020603050405020304" pitchFamily="18" charset="0"/>
@@ -10996,7 +10996,47 @@
                 <a:latin typeface="Times New Roman" panose="02020603050405020304" pitchFamily="18" charset="0"/>
                 <a:cs typeface="Times New Roman" panose="02020603050405020304" pitchFamily="18" charset="0"/>
               </a:rPr>
-              <a:t>Entrada / Saídas</a:t>
+              <a:t>Entrada (</a:t>
+            </a:r>
+            <a:r>
+              <a:rPr lang="pt-BR" sz="2000" b="1" dirty="0">
+                <a:solidFill>
+                  <a:srgbClr val="FF0000"/>
+                </a:solidFill>
+                <a:latin typeface="Times New Roman" panose="02020603050405020304" pitchFamily="18" charset="0"/>
+                <a:cs typeface="Times New Roman" panose="02020603050405020304" pitchFamily="18" charset="0"/>
+              </a:rPr>
+              <a:t>atribuição e/ou input</a:t>
+            </a:r>
+            <a:r>
+              <a:rPr lang="pt-BR" sz="2000" dirty="0">
+                <a:solidFill>
+                  <a:schemeClr val="tx1"/>
+                </a:solidFill>
+                <a:latin typeface="Times New Roman" panose="02020603050405020304" pitchFamily="18" charset="0"/>
+                <a:cs typeface="Times New Roman" panose="02020603050405020304" pitchFamily="18" charset="0"/>
+              </a:rPr>
+              <a:t>) / Saídas (</a:t>
+            </a:r>
+            <a:r>
+              <a:rPr lang="pt-BR" sz="2000" b="1" dirty="0">
+                <a:solidFill>
+                  <a:srgbClr val="FF0000"/>
+                </a:solidFill>
+                <a:latin typeface="Times New Roman" panose="02020603050405020304" pitchFamily="18" charset="0"/>
+                <a:cs typeface="Times New Roman" panose="02020603050405020304" pitchFamily="18" charset="0"/>
+              </a:rPr>
+              <a:t>print</a:t>
+            </a:r>
+            <a:r>
+              <a:rPr lang="pt-BR" sz="2000" dirty="0">
+                <a:solidFill>
+                  <a:schemeClr val="tx1"/>
+                </a:solidFill>
+                <a:latin typeface="Times New Roman" panose="02020603050405020304" pitchFamily="18" charset="0"/>
+                <a:cs typeface="Times New Roman" panose="02020603050405020304" pitchFamily="18" charset="0"/>
+              </a:rPr>
+              <a:t>)</a:t>
             </a:r>
           </a:p>
           <a:p>
@@ -11130,7 +11170,7 @@
                 <a:latin typeface="Times New Roman" panose="02020603050405020304" pitchFamily="18" charset="0"/>
                 <a:cs typeface="Times New Roman" panose="02020603050405020304" pitchFamily="18" charset="0"/>
               </a:rPr>
-              <a:t>Funções</a:t>
+              <a:t>Funções / Recursividade</a:t>
             </a:r>
           </a:p>
           <a:p>
@@ -11162,7 +11202,27 @@
                 <a:latin typeface="Times New Roman" panose="02020603050405020304" pitchFamily="18" charset="0"/>
                 <a:cs typeface="Times New Roman" panose="02020603050405020304" pitchFamily="18" charset="0"/>
               </a:rPr>
-              <a:t>Classes</a:t>
+              <a:t>Classes (</a:t>
+            </a:r>
+            <a:r>
+              <a:rPr lang="pt-BR" sz="2000" b="1" dirty="0">
+                <a:solidFill>
+                  <a:srgbClr val="FF0000"/>
+                </a:solidFill>
+                <a:latin typeface="Times New Roman" panose="02020603050405020304" pitchFamily="18" charset="0"/>
+                <a:cs typeface="Times New Roman" panose="02020603050405020304" pitchFamily="18" charset="0"/>
+              </a:rPr>
+              <a:t>Orientação a Objetos</a:t>
+            </a:r>
+            <a:r>
+              <a:rPr lang="pt-BR" sz="2000" dirty="0">
+                <a:solidFill>
+                  <a:schemeClr val="tx1"/>
+                </a:solidFill>
+                <a:latin typeface="Times New Roman" panose="02020603050405020304" pitchFamily="18" charset="0"/>
+                <a:cs typeface="Times New Roman" panose="02020603050405020304" pitchFamily="18" charset="0"/>
+              </a:rPr>
+              <a:t>)</a:t>
             </a:r>
           </a:p>
           <a:p>
@@ -11178,7 +11238,27 @@
                 <a:latin typeface="Times New Roman" panose="02020603050405020304" pitchFamily="18" charset="0"/>
                 <a:cs typeface="Times New Roman" panose="02020603050405020304" pitchFamily="18" charset="0"/>
               </a:rPr>
-              <a:t>Módulos/Pacotes</a:t>
+              <a:t>Módulos/Pacotes (</a:t>
+            </a:r>
+            <a:r>
+              <a:rPr lang="pt-BR" sz="2000" b="1" dirty="0" err="1">
+                <a:solidFill>
+                  <a:srgbClr val="FF0000"/>
+                </a:solidFill>
+                <a:latin typeface="Times New Roman" panose="02020603050405020304" pitchFamily="18" charset="0"/>
+                <a:cs typeface="Times New Roman" panose="02020603050405020304" pitchFamily="18" charset="0"/>
+              </a:rPr>
+              <a:t>import</a:t>
+            </a:r>
+            <a:r>
+              <a:rPr lang="pt-BR" sz="2000" dirty="0">
+                <a:solidFill>
+                  <a:schemeClr val="tx1"/>
+                </a:solidFill>
+                <a:latin typeface="Times New Roman" panose="02020603050405020304" pitchFamily="18" charset="0"/>
+                <a:cs typeface="Times New Roman" panose="02020603050405020304" pitchFamily="18" charset="0"/>
+              </a:rPr>
+              <a:t>)</a:t>
             </a:r>
           </a:p>
           <a:p>
@@ -11194,7 +11274,37 @@
                 <a:latin typeface="Times New Roman" panose="02020603050405020304" pitchFamily="18" charset="0"/>
                 <a:cs typeface="Times New Roman" panose="02020603050405020304" pitchFamily="18" charset="0"/>
               </a:rPr>
-              <a:t>Ambientes Virtuais</a:t>
+              <a:t>Ambientes Virtuais (</a:t>
+            </a:r>
+            <a:r>
+              <a:rPr lang="pt-BR" sz="2000" b="1" dirty="0">
+                <a:solidFill>
+                  <a:srgbClr val="FF0000"/>
+                </a:solidFill>
+                <a:latin typeface="Times New Roman" panose="02020603050405020304" pitchFamily="18" charset="0"/>
+                <a:cs typeface="Times New Roman" panose="02020603050405020304" pitchFamily="18" charset="0"/>
+              </a:rPr>
+              <a:t>Conf. Variáveis, </a:t>
+            </a:r>
+            <a:r>
+              <a:rPr lang="pt-BR" sz="2000" b="1" dirty="0" err="1">
+                <a:solidFill>
+                  <a:srgbClr val="FF0000"/>
+                </a:solidFill>
+                <a:latin typeface="Times New Roman" panose="02020603050405020304" pitchFamily="18" charset="0"/>
+                <a:cs typeface="Times New Roman" panose="02020603050405020304" pitchFamily="18" charset="0"/>
+              </a:rPr>
+              <a:t>etc</a:t>
+            </a:r>
+            <a:r>
+              <a:rPr lang="pt-BR" sz="2000" dirty="0">
+                <a:solidFill>
+                  <a:schemeClr val="tx1"/>
+                </a:solidFill>
+                <a:latin typeface="Times New Roman" panose="02020603050405020304" pitchFamily="18" charset="0"/>
+                <a:cs typeface="Times New Roman" panose="02020603050405020304" pitchFamily="18" charset="0"/>
+              </a:rPr>
+              <a:t>)</a:t>
             </a:r>
           </a:p>
           <a:p>
@@ -11213,9 +11323,9 @@
               <a:t>Erros e Exceções (</a:t>
             </a:r>
             <a:r>
-              <a:rPr lang="pt-BR" sz="2000" dirty="0" err="1">
-                <a:solidFill>
-                  <a:schemeClr val="tx1"/>
+              <a:rPr lang="pt-BR" sz="2000" b="1" dirty="0" err="1">
+                <a:solidFill>
+                  <a:srgbClr val="FF0000"/>
                 </a:solidFill>
                 <a:latin typeface="Times New Roman" panose="02020603050405020304" pitchFamily="18" charset="0"/>
                 <a:cs typeface="Times New Roman" panose="02020603050405020304" pitchFamily="18" charset="0"/>
@@ -11223,42 +11333,45 @@
               <a:t>try</a:t>
             </a:r>
             <a:r>
+              <a:rPr lang="pt-BR" sz="2000" b="1" dirty="0">
+                <a:solidFill>
+                  <a:srgbClr val="FF0000"/>
+                </a:solidFill>
+                <a:latin typeface="Times New Roman" panose="02020603050405020304" pitchFamily="18" charset="0"/>
+                <a:cs typeface="Times New Roman" panose="02020603050405020304" pitchFamily="18" charset="0"/>
+              </a:rPr>
+              <a:t>: ... </a:t>
+            </a:r>
+            <a:r>
+              <a:rPr lang="pt-BR" sz="2000" b="1" dirty="0" err="1">
+                <a:solidFill>
+                  <a:srgbClr val="FF0000"/>
+                </a:solidFill>
+                <a:latin typeface="Times New Roman" panose="02020603050405020304" pitchFamily="18" charset="0"/>
+                <a:cs typeface="Times New Roman" panose="02020603050405020304" pitchFamily="18" charset="0"/>
+              </a:rPr>
+              <a:t>except</a:t>
+            </a:r>
+            <a:r>
+              <a:rPr lang="pt-BR" sz="2000" b="1" dirty="0">
+                <a:solidFill>
+                  <a:srgbClr val="FF0000"/>
+                </a:solidFill>
+                <a:latin typeface="Times New Roman" panose="02020603050405020304" pitchFamily="18" charset="0"/>
+                <a:cs typeface="Times New Roman" panose="02020603050405020304" pitchFamily="18" charset="0"/>
+              </a:rPr>
+              <a:t>:</a:t>
+            </a:r>
+            <a:r>
               <a:rPr lang="pt-BR" sz="2000" dirty="0">
                 <a:solidFill>
-                  <a:schemeClr val="tx1"/>
-                </a:solidFill>
-                <a:latin typeface="Times New Roman" panose="02020603050405020304" pitchFamily="18" charset="0"/>
-                <a:cs typeface="Times New Roman" panose="02020603050405020304" pitchFamily="18" charset="0"/>
-              </a:rPr>
-              <a:t>: ... </a:t>
-            </a:r>
-            <a:r>
-              <a:rPr lang="pt-BR" sz="2000" dirty="0" err="1">
-                <a:solidFill>
-                  <a:schemeClr val="tx1"/>
-                </a:solidFill>
-                <a:latin typeface="Times New Roman" panose="02020603050405020304" pitchFamily="18" charset="0"/>
-                <a:cs typeface="Times New Roman" panose="02020603050405020304" pitchFamily="18" charset="0"/>
-              </a:rPr>
-              <a:t>excpet</a:t>
-            </a:r>
-            <a:r>
-              <a:rPr lang="pt-BR" sz="2000">
-                <a:solidFill>
-                  <a:schemeClr val="tx1"/>
-                </a:solidFill>
-                <a:latin typeface="Times New Roman" panose="02020603050405020304" pitchFamily="18" charset="0"/>
-                <a:cs typeface="Times New Roman" panose="02020603050405020304" pitchFamily="18" charset="0"/>
-              </a:rPr>
-              <a:t>:  </a:t>
-            </a:r>
-            <a:endParaRPr lang="pt-BR" sz="2000" dirty="0">
-              <a:solidFill>
-                <a:schemeClr val="tx1"/>
-              </a:solidFill>
-              <a:latin typeface="Times New Roman" panose="02020603050405020304" pitchFamily="18" charset="0"/>
-              <a:cs typeface="Times New Roman" panose="02020603050405020304" pitchFamily="18" charset="0"/>
-            </a:endParaRPr>
+                  <a:srgbClr val="FF0000"/>
+                </a:solidFill>
+                <a:latin typeface="Times New Roman" panose="02020603050405020304" pitchFamily="18" charset="0"/>
+                <a:cs typeface="Times New Roman" panose="02020603050405020304" pitchFamily="18" charset="0"/>
+              </a:rPr>
+              <a:t>)  </a:t>
+            </a:r>
           </a:p>
           <a:p>
             <a:pPr marL="457200" indent="-457200" algn="just">

</xml_diff>

<commit_message>
atualização slides de aulas 30Ago2023
</commit_message>
<xml_diff>
--- a/01 Classes/Aula 02 Programação Python - Variáveis e Expressões.pptx
+++ b/01 Classes/Aula 02 Programação Python - Variáveis e Expressões.pptx
@@ -6027,8 +6027,8 @@
         </p:nvSpPr>
         <p:spPr>
           <a:xfrm>
-            <a:off x="142865" y="1200150"/>
-            <a:ext cx="8865056" cy="3847839"/>
+            <a:off x="142865" y="984250"/>
+            <a:ext cx="8865056" cy="3953270"/>
           </a:xfrm>
         </p:spPr>
         <p:txBody>
@@ -6041,6 +6041,16 @@
               <a:buNone/>
             </a:pPr>
             <a:r>
+              <a:rPr lang="pt-BR" sz="2400" dirty="0">
+                <a:solidFill>
+                  <a:schemeClr val="tx1"/>
+                </a:solidFill>
+                <a:latin typeface="Times New Roman" panose="02020603050405020304" pitchFamily="18" charset="0"/>
+                <a:cs typeface="Times New Roman" panose="02020603050405020304" pitchFamily="18" charset="0"/>
+              </a:rPr>
+              <a:t>cidade = ‘Salvador’ </a:t>
+            </a:r>
+            <a:r>
               <a:rPr lang="pt-BR" sz="2400" b="1" dirty="0">
                 <a:solidFill>
                   <a:schemeClr val="tx1"/>
@@ -6048,7 +6058,7 @@
                 <a:latin typeface="Times New Roman" panose="02020603050405020304" pitchFamily="18" charset="0"/>
                 <a:cs typeface="Times New Roman" panose="02020603050405020304" pitchFamily="18" charset="0"/>
               </a:rPr>
-              <a:t>Exemplo:</a:t>
+              <a:t>			# Exemplos:</a:t>
             </a:r>
             <a:r>
               <a:rPr lang="pt-BR" sz="2400" dirty="0">
@@ -6073,7 +6083,7 @@
                 <a:latin typeface="Times New Roman" panose="02020603050405020304" pitchFamily="18" charset="0"/>
                 <a:cs typeface="Times New Roman" panose="02020603050405020304" pitchFamily="18" charset="0"/>
               </a:rPr>
-              <a:t>cidade = ‘Salvador'</a:t>
+              <a:t>n = 18</a:t>
             </a:r>
           </a:p>
           <a:p>
@@ -6088,7 +6098,7 @@
                 <a:latin typeface="Times New Roman" panose="02020603050405020304" pitchFamily="18" charset="0"/>
                 <a:cs typeface="Times New Roman" panose="02020603050405020304" pitchFamily="18" charset="0"/>
               </a:rPr>
-              <a:t>n = 18</a:t>
+              <a:t>pi = 3.14159265</a:t>
             </a:r>
           </a:p>
           <a:p>
@@ -6096,14 +6106,24 @@
               <a:buNone/>
             </a:pPr>
             <a:r>
-              <a:rPr lang="pt-BR" sz="2400" dirty="0">
-                <a:solidFill>
-                  <a:schemeClr val="tx1"/>
-                </a:solidFill>
-                <a:latin typeface="Times New Roman" panose="02020603050405020304" pitchFamily="18" charset="0"/>
-                <a:cs typeface="Times New Roman" panose="02020603050405020304" pitchFamily="18" charset="0"/>
-              </a:rPr>
-              <a:t>pi = 3.14159265</a:t>
+              <a:rPr lang="en-US" sz="2400" dirty="0" err="1">
+                <a:solidFill>
+                  <a:schemeClr val="tx1"/>
+                </a:solidFill>
+                <a:latin typeface="Times New Roman" panose="02020603050405020304" pitchFamily="18" charset="0"/>
+                <a:cs typeface="Times New Roman" panose="02020603050405020304" pitchFamily="18" charset="0"/>
+              </a:rPr>
+              <a:t>resposta</a:t>
+            </a:r>
+            <a:r>
+              <a:rPr lang="en-US" sz="2400" dirty="0">
+                <a:solidFill>
+                  <a:schemeClr val="tx1"/>
+                </a:solidFill>
+                <a:latin typeface="Times New Roman" panose="02020603050405020304" pitchFamily="18" charset="0"/>
+                <a:cs typeface="Times New Roman" panose="02020603050405020304" pitchFamily="18" charset="0"/>
+              </a:rPr>
+              <a:t> = True</a:t>
             </a:r>
           </a:p>
           <a:p>
@@ -6123,6 +6143,16 @@
               <a:buNone/>
             </a:pPr>
             <a:r>
+              <a:rPr lang="en-US" sz="2400" b="1" dirty="0">
+                <a:solidFill>
+                  <a:schemeClr val="tx1"/>
+                </a:solidFill>
+                <a:latin typeface="Times New Roman" panose="02020603050405020304" pitchFamily="18" charset="0"/>
+                <a:cs typeface="Times New Roman" panose="02020603050405020304" pitchFamily="18" charset="0"/>
+              </a:rPr>
+              <a:t>print</a:t>
+            </a:r>
+            <a:r>
               <a:rPr lang="en-US" sz="2400" dirty="0">
                 <a:solidFill>
                   <a:schemeClr val="tx1"/>
@@ -6130,7 +6160,7 @@
                 <a:latin typeface="Times New Roman" panose="02020603050405020304" pitchFamily="18" charset="0"/>
                 <a:cs typeface="Times New Roman" panose="02020603050405020304" pitchFamily="18" charset="0"/>
               </a:rPr>
-              <a:t>type (</a:t>
+              <a:t>(type (</a:t>
             </a:r>
             <a:r>
               <a:rPr lang="en-US" sz="2400" dirty="0" err="1">
@@ -6150,7 +6180,27 @@
                 <a:latin typeface="Times New Roman" panose="02020603050405020304" pitchFamily="18" charset="0"/>
                 <a:cs typeface="Times New Roman" panose="02020603050405020304" pitchFamily="18" charset="0"/>
               </a:rPr>
-              <a:t>) # &lt;class 'str'&gt;</a:t>
+              <a:t>)) # &lt;class </a:t>
+            </a:r>
+            <a:r>
+              <a:rPr lang="en-US" sz="2400" b="1" dirty="0">
+                <a:solidFill>
+                  <a:schemeClr val="tx1"/>
+                </a:solidFill>
+                <a:latin typeface="Times New Roman" panose="02020603050405020304" pitchFamily="18" charset="0"/>
+                <a:cs typeface="Times New Roman" panose="02020603050405020304" pitchFamily="18" charset="0"/>
+              </a:rPr>
+              <a:t>'str</a:t>
+            </a:r>
+            <a:r>
+              <a:rPr lang="en-US" sz="2400" dirty="0">
+                <a:solidFill>
+                  <a:schemeClr val="tx1"/>
+                </a:solidFill>
+                <a:latin typeface="Times New Roman" panose="02020603050405020304" pitchFamily="18" charset="0"/>
+                <a:cs typeface="Times New Roman" panose="02020603050405020304" pitchFamily="18" charset="0"/>
+              </a:rPr>
+              <a:t>'&gt;</a:t>
             </a:r>
           </a:p>
           <a:p>
@@ -6158,6 +6208,16 @@
               <a:buNone/>
             </a:pPr>
             <a:r>
+              <a:rPr lang="en-US" sz="2400" b="1" dirty="0">
+                <a:solidFill>
+                  <a:schemeClr val="tx1"/>
+                </a:solidFill>
+                <a:latin typeface="Times New Roman" panose="02020603050405020304" pitchFamily="18" charset="0"/>
+                <a:cs typeface="Times New Roman" panose="02020603050405020304" pitchFamily="18" charset="0"/>
+              </a:rPr>
+              <a:t>print</a:t>
+            </a:r>
+            <a:r>
               <a:rPr lang="en-US" sz="2400" dirty="0">
                 <a:solidFill>
                   <a:schemeClr val="tx1"/>
@@ -6165,7 +6225,27 @@
                 <a:latin typeface="Times New Roman" panose="02020603050405020304" pitchFamily="18" charset="0"/>
                 <a:cs typeface="Times New Roman" panose="02020603050405020304" pitchFamily="18" charset="0"/>
               </a:rPr>
-              <a:t>type (n) # &lt;class 'int'&gt;</a:t>
+              <a:t>(type (n)) # &lt;class </a:t>
+            </a:r>
+            <a:r>
+              <a:rPr lang="en-US" sz="2400" b="1" dirty="0">
+                <a:solidFill>
+                  <a:schemeClr val="tx1"/>
+                </a:solidFill>
+                <a:latin typeface="Times New Roman" panose="02020603050405020304" pitchFamily="18" charset="0"/>
+                <a:cs typeface="Times New Roman" panose="02020603050405020304" pitchFamily="18" charset="0"/>
+              </a:rPr>
+              <a:t>'int</a:t>
+            </a:r>
+            <a:r>
+              <a:rPr lang="en-US" sz="2400" dirty="0">
+                <a:solidFill>
+                  <a:schemeClr val="tx1"/>
+                </a:solidFill>
+                <a:latin typeface="Times New Roman" panose="02020603050405020304" pitchFamily="18" charset="0"/>
+                <a:cs typeface="Times New Roman" panose="02020603050405020304" pitchFamily="18" charset="0"/>
+              </a:rPr>
+              <a:t>’&gt;</a:t>
             </a:r>
           </a:p>
           <a:p>
@@ -6173,6 +6253,16 @@
               <a:buNone/>
             </a:pPr>
             <a:r>
+              <a:rPr lang="en-US" sz="2400" b="1" dirty="0">
+                <a:solidFill>
+                  <a:schemeClr val="tx1"/>
+                </a:solidFill>
+                <a:latin typeface="Times New Roman" panose="02020603050405020304" pitchFamily="18" charset="0"/>
+                <a:cs typeface="Times New Roman" panose="02020603050405020304" pitchFamily="18" charset="0"/>
+              </a:rPr>
+              <a:t>print</a:t>
+            </a:r>
+            <a:r>
               <a:rPr lang="en-US" sz="2400" dirty="0">
                 <a:solidFill>
                   <a:schemeClr val="tx1"/>
@@ -6180,7 +6270,27 @@
                 <a:latin typeface="Times New Roman" panose="02020603050405020304" pitchFamily="18" charset="0"/>
                 <a:cs typeface="Times New Roman" panose="02020603050405020304" pitchFamily="18" charset="0"/>
               </a:rPr>
-              <a:t>type (pi) # &lt;class 'float'&gt;</a:t>
+              <a:t>(type (pi)) # &lt;class </a:t>
+            </a:r>
+            <a:r>
+              <a:rPr lang="en-US" sz="2400" b="1" dirty="0">
+                <a:solidFill>
+                  <a:schemeClr val="tx1"/>
+                </a:solidFill>
+                <a:latin typeface="Times New Roman" panose="02020603050405020304" pitchFamily="18" charset="0"/>
+                <a:cs typeface="Times New Roman" panose="02020603050405020304" pitchFamily="18" charset="0"/>
+              </a:rPr>
+              <a:t>'float</a:t>
+            </a:r>
+            <a:r>
+              <a:rPr lang="en-US" sz="2400" dirty="0">
+                <a:solidFill>
+                  <a:schemeClr val="tx1"/>
+                </a:solidFill>
+                <a:latin typeface="Times New Roman" panose="02020603050405020304" pitchFamily="18" charset="0"/>
+                <a:cs typeface="Times New Roman" panose="02020603050405020304" pitchFamily="18" charset="0"/>
+              </a:rPr>
+              <a:t>'&gt;</a:t>
             </a:r>
             <a:endParaRPr lang="pt-BR" sz="2400" dirty="0">
               <a:solidFill>
@@ -6189,6 +6299,71 @@
               <a:latin typeface="Times New Roman" panose="02020603050405020304" pitchFamily="18" charset="0"/>
               <a:cs typeface="Times New Roman" panose="02020603050405020304" pitchFamily="18" charset="0"/>
             </a:endParaRPr>
+          </a:p>
+          <a:p>
+            <a:pPr marL="0" indent="0" algn="just">
+              <a:buNone/>
+            </a:pPr>
+            <a:r>
+              <a:rPr lang="en-US" sz="2400" b="1" dirty="0">
+                <a:solidFill>
+                  <a:schemeClr val="tx1"/>
+                </a:solidFill>
+                <a:latin typeface="Times New Roman" panose="02020603050405020304" pitchFamily="18" charset="0"/>
+                <a:cs typeface="Times New Roman" panose="02020603050405020304" pitchFamily="18" charset="0"/>
+              </a:rPr>
+              <a:t>print</a:t>
+            </a:r>
+            <a:r>
+              <a:rPr lang="en-US" sz="2400" dirty="0">
+                <a:solidFill>
+                  <a:schemeClr val="tx1"/>
+                </a:solidFill>
+                <a:latin typeface="Times New Roman" panose="02020603050405020304" pitchFamily="18" charset="0"/>
+                <a:cs typeface="Times New Roman" panose="02020603050405020304" pitchFamily="18" charset="0"/>
+              </a:rPr>
+              <a:t>(type (</a:t>
+            </a:r>
+            <a:r>
+              <a:rPr lang="en-US" sz="2400" dirty="0" err="1">
+                <a:solidFill>
+                  <a:schemeClr val="tx1"/>
+                </a:solidFill>
+                <a:latin typeface="Times New Roman" panose="02020603050405020304" pitchFamily="18" charset="0"/>
+                <a:cs typeface="Times New Roman" panose="02020603050405020304" pitchFamily="18" charset="0"/>
+              </a:rPr>
+              <a:t>resposta</a:t>
+            </a:r>
+            <a:r>
+              <a:rPr lang="en-US" sz="2400" dirty="0">
+                <a:solidFill>
+                  <a:schemeClr val="tx1"/>
+                </a:solidFill>
+                <a:latin typeface="Times New Roman" panose="02020603050405020304" pitchFamily="18" charset="0"/>
+                <a:cs typeface="Times New Roman" panose="02020603050405020304" pitchFamily="18" charset="0"/>
+              </a:rPr>
+              <a:t>)) # &lt;class ‘</a:t>
+            </a:r>
+            <a:r>
+              <a:rPr lang="en-US" sz="2400" b="1" dirty="0">
+                <a:solidFill>
+                  <a:schemeClr val="tx1"/>
+                </a:solidFill>
+                <a:latin typeface="Times New Roman" panose="02020603050405020304" pitchFamily="18" charset="0"/>
+                <a:cs typeface="Times New Roman" panose="02020603050405020304" pitchFamily="18" charset="0"/>
+              </a:rPr>
+              <a:t>bool</a:t>
+            </a:r>
+            <a:r>
+              <a:rPr lang="en-US" sz="2400" dirty="0">
+                <a:solidFill>
+                  <a:schemeClr val="tx1"/>
+                </a:solidFill>
+                <a:latin typeface="Times New Roman" panose="02020603050405020304" pitchFamily="18" charset="0"/>
+                <a:cs typeface="Times New Roman" panose="02020603050405020304" pitchFamily="18" charset="0"/>
+              </a:rPr>
+              <a:t>'&gt;</a:t>
+            </a:r>
           </a:p>
         </p:txBody>
       </p:sp>
@@ -6866,7 +7041,27 @@
                 <a:latin typeface="Times New Roman" panose="02020603050405020304" pitchFamily="18" charset="0"/>
                 <a:cs typeface="Times New Roman" panose="02020603050405020304" pitchFamily="18" charset="0"/>
               </a:rPr>
-              <a:t>    print("Variável global: ", VAR_GLOBAL)</a:t>
+              <a:t>    </a:t>
+            </a:r>
+            <a:r>
+              <a:rPr lang="pt-BR" sz="1500" b="1" dirty="0">
+                <a:solidFill>
+                  <a:schemeClr val="tx1"/>
+                </a:solidFill>
+                <a:latin typeface="Times New Roman" panose="02020603050405020304" pitchFamily="18" charset="0"/>
+                <a:cs typeface="Times New Roman" panose="02020603050405020304" pitchFamily="18" charset="0"/>
+              </a:rPr>
+              <a:t>print</a:t>
+            </a:r>
+            <a:r>
+              <a:rPr lang="pt-BR" sz="1500" dirty="0">
+                <a:solidFill>
+                  <a:schemeClr val="tx1"/>
+                </a:solidFill>
+                <a:latin typeface="Times New Roman" panose="02020603050405020304" pitchFamily="18" charset="0"/>
+                <a:cs typeface="Times New Roman" panose="02020603050405020304" pitchFamily="18" charset="0"/>
+              </a:rPr>
+              <a:t>("Variável global: ", VAR_GLOBAL)</a:t>
             </a:r>
           </a:p>
           <a:p>
@@ -6881,7 +7076,27 @@
                 <a:latin typeface="Times New Roman" panose="02020603050405020304" pitchFamily="18" charset="0"/>
                 <a:cs typeface="Times New Roman" panose="02020603050405020304" pitchFamily="18" charset="0"/>
               </a:rPr>
-              <a:t>    print("Variável local: ", VAR_LOCAL)</a:t>
+              <a:t>    </a:t>
+            </a:r>
+            <a:r>
+              <a:rPr lang="pt-BR" sz="1500" b="1" dirty="0">
+                <a:solidFill>
+                  <a:schemeClr val="tx1"/>
+                </a:solidFill>
+                <a:latin typeface="Times New Roman" panose="02020603050405020304" pitchFamily="18" charset="0"/>
+                <a:cs typeface="Times New Roman" panose="02020603050405020304" pitchFamily="18" charset="0"/>
+              </a:rPr>
+              <a:t>print</a:t>
+            </a:r>
+            <a:r>
+              <a:rPr lang="pt-BR" sz="1500" dirty="0">
+                <a:solidFill>
+                  <a:schemeClr val="tx1"/>
+                </a:solidFill>
+                <a:latin typeface="Times New Roman" panose="02020603050405020304" pitchFamily="18" charset="0"/>
+                <a:cs typeface="Times New Roman" panose="02020603050405020304" pitchFamily="18" charset="0"/>
+              </a:rPr>
+              <a:t>("Variável local: ", VAR_LOCAL)</a:t>
             </a:r>
           </a:p>
           <a:p>
@@ -6901,6 +7116,16 @@
               <a:buNone/>
             </a:pPr>
             <a:r>
+              <a:rPr lang="pt-BR" sz="1500" b="1" dirty="0">
+                <a:solidFill>
+                  <a:schemeClr val="tx1"/>
+                </a:solidFill>
+                <a:latin typeface="Times New Roman" panose="02020603050405020304" pitchFamily="18" charset="0"/>
+                <a:cs typeface="Times New Roman" panose="02020603050405020304" pitchFamily="18" charset="0"/>
+              </a:rPr>
+              <a:t>print</a:t>
+            </a:r>
+            <a:r>
               <a:rPr lang="pt-BR" sz="1500" dirty="0">
                 <a:solidFill>
                   <a:schemeClr val="tx1"/>
@@ -6908,7 +7133,7 @@
                 <a:latin typeface="Times New Roman" panose="02020603050405020304" pitchFamily="18" charset="0"/>
                 <a:cs typeface="Times New Roman" panose="02020603050405020304" pitchFamily="18" charset="0"/>
               </a:rPr>
-              <a:t>print("Executando a função </a:t>
+              <a:t>("Executando a função </a:t>
             </a:r>
             <a:r>
               <a:rPr lang="pt-BR" sz="1500" dirty="0" err="1">
@@ -6985,6 +7210,16 @@
               <a:buNone/>
             </a:pPr>
             <a:r>
+              <a:rPr lang="pt-BR" sz="1500" b="1" dirty="0">
+                <a:solidFill>
+                  <a:schemeClr val="tx1"/>
+                </a:solidFill>
+                <a:latin typeface="Times New Roman" panose="02020603050405020304" pitchFamily="18" charset="0"/>
+                <a:cs typeface="Times New Roman" panose="02020603050405020304" pitchFamily="18" charset="0"/>
+              </a:rPr>
+              <a:t>print</a:t>
+            </a:r>
+            <a:r>
               <a:rPr lang="pt-BR" sz="1500" dirty="0">
                 <a:solidFill>
                   <a:schemeClr val="tx1"/>
@@ -6992,7 +7227,7 @@
                 <a:latin typeface="Times New Roman" panose="02020603050405020304" pitchFamily="18" charset="0"/>
                 <a:cs typeface="Times New Roman" panose="02020603050405020304" pitchFamily="18" charset="0"/>
               </a:rPr>
-              <a:t>print("\</a:t>
+              <a:t>("\</a:t>
             </a:r>
             <a:r>
               <a:rPr lang="pt-BR" sz="1500" dirty="0" err="1">
@@ -7020,6 +7255,16 @@
               <a:buNone/>
             </a:pPr>
             <a:r>
+              <a:rPr lang="pt-BR" sz="1500" b="1" dirty="0">
+                <a:solidFill>
+                  <a:schemeClr val="tx1"/>
+                </a:solidFill>
+                <a:latin typeface="Times New Roman" panose="02020603050405020304" pitchFamily="18" charset="0"/>
+                <a:cs typeface="Times New Roman" panose="02020603050405020304" pitchFamily="18" charset="0"/>
+              </a:rPr>
+              <a:t>print</a:t>
+            </a:r>
+            <a:r>
               <a:rPr lang="pt-BR" sz="1500" dirty="0">
                 <a:solidFill>
                   <a:schemeClr val="tx1"/>
@@ -7027,7 +7272,7 @@
                 <a:latin typeface="Times New Roman" panose="02020603050405020304" pitchFamily="18" charset="0"/>
                 <a:cs typeface="Times New Roman" panose="02020603050405020304" pitchFamily="18" charset="0"/>
               </a:rPr>
-              <a:t>print("Variável global: ", VAR_GLOBAL)</a:t>
+              <a:t>("Variável global: ", VAR_GLOBAL)</a:t>
             </a:r>
           </a:p>
           <a:p>
@@ -7035,6 +7280,16 @@
               <a:buNone/>
             </a:pPr>
             <a:r>
+              <a:rPr lang="pt-BR" sz="1500" b="1" dirty="0">
+                <a:solidFill>
+                  <a:schemeClr val="tx1"/>
+                </a:solidFill>
+                <a:latin typeface="Times New Roman" panose="02020603050405020304" pitchFamily="18" charset="0"/>
+                <a:cs typeface="Times New Roman" panose="02020603050405020304" pitchFamily="18" charset="0"/>
+              </a:rPr>
+              <a:t>print</a:t>
+            </a:r>
+            <a:r>
               <a:rPr lang="pt-BR" sz="1500" dirty="0">
                 <a:solidFill>
                   <a:schemeClr val="tx1"/>
@@ -7042,7 +7297,7 @@
                 <a:latin typeface="Times New Roman" panose="02020603050405020304" pitchFamily="18" charset="0"/>
                 <a:cs typeface="Times New Roman" panose="02020603050405020304" pitchFamily="18" charset="0"/>
               </a:rPr>
-              <a:t>print("Variável local: ", VAR_LOCAL)</a:t>
+              <a:t>("Variável local: ", VAR_LOCAL)</a:t>
             </a:r>
           </a:p>
         </p:txBody>
@@ -10815,8 +11070,8 @@
         </p:nvSpPr>
         <p:spPr>
           <a:xfrm>
-            <a:off x="148604" y="1063231"/>
-            <a:ext cx="5550737" cy="2246765"/>
+            <a:off x="148604" y="936231"/>
+            <a:ext cx="8068296" cy="3970314"/>
           </a:xfrm>
           <a:prstGeom prst="rect">
             <a:avLst/>
@@ -10849,14 +11104,34 @@
               <a:buAutoNum type="arabicPeriod"/>
             </a:pPr>
             <a:r>
-              <a:rPr lang="pt-BR" sz="2000" dirty="0">
-                <a:solidFill>
-                  <a:schemeClr val="tx1"/>
-                </a:solidFill>
-                <a:latin typeface="Times New Roman" panose="02020603050405020304" pitchFamily="18" charset="0"/>
-                <a:cs typeface="Times New Roman" panose="02020603050405020304" pitchFamily="18" charset="0"/>
-              </a:rPr>
-              <a:t>Operadores</a:t>
+              <a:rPr lang="pt-BR" dirty="0">
+                <a:solidFill>
+                  <a:schemeClr val="tx1"/>
+                </a:solidFill>
+                <a:latin typeface="Times New Roman" panose="02020603050405020304" pitchFamily="18" charset="0"/>
+                <a:cs typeface="Times New Roman" panose="02020603050405020304" pitchFamily="18" charset="0"/>
+              </a:rPr>
+              <a:t>Paradigmas</a:t>
+            </a:r>
+            <a:r>
+              <a:rPr lang="pt-BR">
+                <a:solidFill>
+                  <a:schemeClr val="tx1"/>
+                </a:solidFill>
+                <a:latin typeface="Times New Roman" panose="02020603050405020304" pitchFamily="18" charset="0"/>
+                <a:cs typeface="Times New Roman" panose="02020603050405020304" pitchFamily="18" charset="0"/>
+              </a:rPr>
+              <a:t>/Domínios/Interpretador</a:t>
+            </a:r>
+            <a:r>
+              <a:rPr lang="pt-BR" dirty="0">
+                <a:solidFill>
+                  <a:schemeClr val="tx1"/>
+                </a:solidFill>
+                <a:latin typeface="Times New Roman" panose="02020603050405020304" pitchFamily="18" charset="0"/>
+                <a:cs typeface="Times New Roman" panose="02020603050405020304" pitchFamily="18" charset="0"/>
+              </a:rPr>
+              <a:t>/Expressões/Operadores/Tabela Verdade</a:t>
             </a:r>
           </a:p>
           <a:p>
@@ -10864,14 +11139,14 @@
               <a:buAutoNum type="arabicPeriod"/>
             </a:pPr>
             <a:r>
-              <a:rPr lang="pt-BR" sz="2000" dirty="0">
-                <a:solidFill>
-                  <a:schemeClr val="tx1"/>
-                </a:solidFill>
-                <a:latin typeface="Times New Roman" panose="02020603050405020304" pitchFamily="18" charset="0"/>
-                <a:cs typeface="Times New Roman" panose="02020603050405020304" pitchFamily="18" charset="0"/>
-              </a:rPr>
-              <a:t>Variáveis/Identificadores</a:t>
+              <a:rPr lang="pt-BR" dirty="0">
+                <a:solidFill>
+                  <a:schemeClr val="tx1"/>
+                </a:solidFill>
+                <a:latin typeface="Times New Roman" panose="02020603050405020304" pitchFamily="18" charset="0"/>
+                <a:cs typeface="Times New Roman" panose="02020603050405020304" pitchFamily="18" charset="0"/>
+              </a:rPr>
+              <a:t>Constantes/Variáveis/Identificadores</a:t>
             </a:r>
           </a:p>
           <a:p>
@@ -10879,7 +11154,7 @@
               <a:buAutoNum type="arabicPeriod"/>
             </a:pPr>
             <a:r>
-              <a:rPr lang="pt-BR" sz="2000" dirty="0">
+              <a:rPr lang="pt-BR" dirty="0">
                 <a:solidFill>
                   <a:schemeClr val="tx1"/>
                 </a:solidFill>
@@ -10889,7 +11164,7 @@
               <a:t>Tipos de Dados (</a:t>
             </a:r>
             <a:r>
-              <a:rPr lang="pt-BR" sz="2000" b="1" dirty="0">
+              <a:rPr lang="pt-BR" b="1" dirty="0">
                 <a:solidFill>
                   <a:schemeClr val="tx1"/>
                 </a:solidFill>
@@ -10899,7 +11174,7 @@
               <a:t>tipagem dinâmica - </a:t>
             </a:r>
             <a:r>
-              <a:rPr lang="pt-BR" sz="2000" b="1" dirty="0" err="1">
+              <a:rPr lang="pt-BR" b="1" dirty="0" err="1">
                 <a:solidFill>
                   <a:srgbClr val="FF0000"/>
                 </a:solidFill>
@@ -10909,7 +11184,7 @@
               <a:t>type</a:t>
             </a:r>
             <a:r>
-              <a:rPr lang="pt-BR" sz="2000" dirty="0">
+              <a:rPr lang="pt-BR" dirty="0">
                 <a:solidFill>
                   <a:schemeClr val="tx1"/>
                 </a:solidFill>
@@ -10924,7 +11199,7 @@
               <a:buAutoNum type="arabicPeriod"/>
             </a:pPr>
             <a:r>
-              <a:rPr lang="pt-BR" sz="2000" dirty="0">
+              <a:rPr lang="pt-BR" dirty="0">
                 <a:solidFill>
                   <a:schemeClr val="tx1"/>
                 </a:solidFill>
@@ -10934,47 +11209,27 @@
               <a:t>Estrutura de Dados: </a:t>
             </a:r>
             <a:r>
-              <a:rPr lang="pt-BR" sz="2000" b="1" dirty="0">
+              <a:rPr lang="pt-BR" b="1" dirty="0">
                 <a:solidFill>
                   <a:srgbClr val="FF0000"/>
                 </a:solidFill>
                 <a:latin typeface="Times New Roman" panose="02020603050405020304" pitchFamily="18" charset="0"/>
                 <a:cs typeface="Times New Roman" panose="02020603050405020304" pitchFamily="18" charset="0"/>
               </a:rPr>
-              <a:t>Listas, </a:t>
-            </a:r>
-            <a:r>
-              <a:rPr lang="pt-BR" sz="2000" b="1" dirty="0" err="1">
+              <a:t>Listas, Tuplas, </a:t>
+            </a:r>
+            <a:r>
+              <a:rPr lang="pt-BR" b="1" dirty="0" err="1">
                 <a:solidFill>
                   <a:srgbClr val="FF0000"/>
                 </a:solidFill>
                 <a:latin typeface="Times New Roman" panose="02020603050405020304" pitchFamily="18" charset="0"/>
                 <a:cs typeface="Times New Roman" panose="02020603050405020304" pitchFamily="18" charset="0"/>
               </a:rPr>
-              <a:t>Tuplas</a:t>
-            </a:r>
-            <a:r>
-              <a:rPr lang="pt-BR" sz="2000" b="1" dirty="0">
-                <a:solidFill>
-                  <a:srgbClr val="FF0000"/>
-                </a:solidFill>
-                <a:latin typeface="Times New Roman" panose="02020603050405020304" pitchFamily="18" charset="0"/>
-                <a:cs typeface="Times New Roman" panose="02020603050405020304" pitchFamily="18" charset="0"/>
-              </a:rPr>
-              <a:t>, </a:t>
-            </a:r>
-            <a:r>
-              <a:rPr lang="pt-BR" sz="2000" b="1" dirty="0" err="1">
-                <a:solidFill>
-                  <a:srgbClr val="FF0000"/>
-                </a:solidFill>
-                <a:latin typeface="Times New Roman" panose="02020603050405020304" pitchFamily="18" charset="0"/>
-                <a:cs typeface="Times New Roman" panose="02020603050405020304" pitchFamily="18" charset="0"/>
-              </a:rPr>
               <a:t>Dics</a:t>
             </a:r>
             <a:r>
-              <a:rPr lang="pt-BR" sz="2000" b="1" dirty="0">
+              <a:rPr lang="pt-BR" b="1" dirty="0">
                 <a:solidFill>
                   <a:srgbClr val="FF0000"/>
                 </a:solidFill>
@@ -10989,17 +11244,17 @@
               <a:buAutoNum type="arabicPeriod"/>
             </a:pPr>
             <a:r>
-              <a:rPr lang="pt-BR" sz="2000" dirty="0">
-                <a:solidFill>
-                  <a:schemeClr val="tx1"/>
-                </a:solidFill>
-                <a:latin typeface="Times New Roman" panose="02020603050405020304" pitchFamily="18" charset="0"/>
-                <a:cs typeface="Times New Roman" panose="02020603050405020304" pitchFamily="18" charset="0"/>
-              </a:rPr>
-              <a:t>Entrada (</a:t>
-            </a:r>
-            <a:r>
-              <a:rPr lang="pt-BR" sz="2000" b="1" dirty="0">
+              <a:rPr lang="pt-BR" dirty="0">
+                <a:solidFill>
+                  <a:schemeClr val="tx1"/>
+                </a:solidFill>
+                <a:latin typeface="Times New Roman" panose="02020603050405020304" pitchFamily="18" charset="0"/>
+                <a:cs typeface="Times New Roman" panose="02020603050405020304" pitchFamily="18" charset="0"/>
+              </a:rPr>
+              <a:t>Entrada de Dados: (</a:t>
+            </a:r>
+            <a:r>
+              <a:rPr lang="pt-BR" b="1" dirty="0">
                 <a:solidFill>
                   <a:srgbClr val="FF0000"/>
                 </a:solidFill>
@@ -11009,17 +11264,17 @@
               <a:t>atribuição e/ou input</a:t>
             </a:r>
             <a:r>
-              <a:rPr lang="pt-BR" sz="2000" dirty="0">
-                <a:solidFill>
-                  <a:schemeClr val="tx1"/>
-                </a:solidFill>
-                <a:latin typeface="Times New Roman" panose="02020603050405020304" pitchFamily="18" charset="0"/>
-                <a:cs typeface="Times New Roman" panose="02020603050405020304" pitchFamily="18" charset="0"/>
-              </a:rPr>
-              <a:t>) / Saídas (</a:t>
-            </a:r>
-            <a:r>
-              <a:rPr lang="pt-BR" sz="2000" b="1" dirty="0">
+              <a:rPr lang="pt-BR" dirty="0">
+                <a:solidFill>
+                  <a:schemeClr val="tx1"/>
+                </a:solidFill>
+                <a:latin typeface="Times New Roman" panose="02020603050405020304" pitchFamily="18" charset="0"/>
+                <a:cs typeface="Times New Roman" panose="02020603050405020304" pitchFamily="18" charset="0"/>
+              </a:rPr>
+              <a:t>) / Saídas de Dados (</a:t>
+            </a:r>
+            <a:r>
+              <a:rPr lang="pt-BR" b="1" dirty="0">
                 <a:solidFill>
                   <a:srgbClr val="FF0000"/>
                 </a:solidFill>
@@ -11029,7 +11284,7 @@
               <a:t>print</a:t>
             </a:r>
             <a:r>
-              <a:rPr lang="pt-BR" sz="2000" dirty="0">
+              <a:rPr lang="pt-BR" dirty="0">
                 <a:solidFill>
                   <a:schemeClr val="tx1"/>
                 </a:solidFill>
@@ -11044,7 +11299,82 @@
               <a:buAutoNum type="arabicPeriod"/>
             </a:pPr>
             <a:r>
-              <a:rPr lang="pt-BR" sz="2000" dirty="0">
+              <a:rPr lang="pt-BR" dirty="0">
+                <a:solidFill>
+                  <a:schemeClr val="tx1"/>
+                </a:solidFill>
+                <a:latin typeface="Times New Roman" panose="02020603050405020304" pitchFamily="18" charset="0"/>
+                <a:cs typeface="Times New Roman" panose="02020603050405020304" pitchFamily="18" charset="0"/>
+              </a:rPr>
+              <a:t>Condicionais: </a:t>
+            </a:r>
+            <a:r>
+              <a:rPr lang="pt-BR" b="1" dirty="0" err="1">
+                <a:solidFill>
+                  <a:schemeClr val="tx1"/>
+                </a:solidFill>
+                <a:latin typeface="Times New Roman" panose="02020603050405020304" pitchFamily="18" charset="0"/>
+                <a:cs typeface="Times New Roman" panose="02020603050405020304" pitchFamily="18" charset="0"/>
+              </a:rPr>
+              <a:t>if</a:t>
+            </a:r>
+            <a:r>
+              <a:rPr lang="pt-BR" dirty="0">
+                <a:solidFill>
+                  <a:schemeClr val="tx1"/>
+                </a:solidFill>
+                <a:latin typeface="Times New Roman" panose="02020603050405020304" pitchFamily="18" charset="0"/>
+                <a:cs typeface="Times New Roman" panose="02020603050405020304" pitchFamily="18" charset="0"/>
+              </a:rPr>
+              <a:t> e </a:t>
+            </a:r>
+            <a:r>
+              <a:rPr lang="pt-BR" b="1" dirty="0" err="1">
+                <a:solidFill>
+                  <a:schemeClr val="tx1"/>
+                </a:solidFill>
+                <a:latin typeface="Times New Roman" panose="02020603050405020304" pitchFamily="18" charset="0"/>
+                <a:cs typeface="Times New Roman" panose="02020603050405020304" pitchFamily="18" charset="0"/>
+              </a:rPr>
+              <a:t>if</a:t>
+            </a:r>
+            <a:r>
+              <a:rPr lang="pt-BR" dirty="0">
+                <a:solidFill>
+                  <a:schemeClr val="tx1"/>
+                </a:solidFill>
+                <a:latin typeface="Times New Roman" panose="02020603050405020304" pitchFamily="18" charset="0"/>
+                <a:cs typeface="Times New Roman" panose="02020603050405020304" pitchFamily="18" charset="0"/>
+              </a:rPr>
+              <a:t> ... </a:t>
+            </a:r>
+            <a:r>
+              <a:rPr lang="pt-BR" b="1" dirty="0" err="1">
+                <a:solidFill>
+                  <a:schemeClr val="tx1"/>
+                </a:solidFill>
+                <a:latin typeface="Times New Roman" panose="02020603050405020304" pitchFamily="18" charset="0"/>
+                <a:cs typeface="Times New Roman" panose="02020603050405020304" pitchFamily="18" charset="0"/>
+              </a:rPr>
+              <a:t>else</a:t>
+            </a:r>
+            <a:r>
+              <a:rPr lang="pt-BR" dirty="0">
+                <a:solidFill>
+                  <a:schemeClr val="tx1"/>
+                </a:solidFill>
+                <a:latin typeface="Times New Roman" panose="02020603050405020304" pitchFamily="18" charset="0"/>
+                <a:cs typeface="Times New Roman" panose="02020603050405020304" pitchFamily="18" charset="0"/>
+              </a:rPr>
+              <a:t> ...</a:t>
+            </a:r>
+          </a:p>
+          <a:p>
+            <a:pPr marL="457200" indent="-457200" algn="just">
+              <a:buAutoNum type="arabicPeriod"/>
+            </a:pPr>
+            <a:r>
+              <a:rPr lang="pt-BR" dirty="0">
                 <a:solidFill>
                   <a:schemeClr val="tx1"/>
                 </a:solidFill>
@@ -11054,7 +11384,7 @@
               <a:t>Loops: </a:t>
             </a:r>
             <a:r>
-              <a:rPr lang="pt-BR" sz="2000" b="1" dirty="0">
+              <a:rPr lang="pt-BR" b="1" dirty="0">
                 <a:solidFill>
                   <a:schemeClr val="tx1"/>
                 </a:solidFill>
@@ -11064,7 +11394,7 @@
               <a:t>for / </a:t>
             </a:r>
             <a:r>
-              <a:rPr lang="pt-BR" sz="2000" b="1" dirty="0" err="1">
+              <a:rPr lang="pt-BR" b="1" dirty="0" err="1">
                 <a:solidFill>
                   <a:schemeClr val="tx1"/>
                 </a:solidFill>
@@ -11073,7 +11403,7 @@
               </a:rPr>
               <a:t>while</a:t>
             </a:r>
-            <a:endParaRPr lang="pt-BR" sz="2000" b="1" dirty="0">
+            <a:endParaRPr lang="pt-BR" b="1" dirty="0">
               <a:solidFill>
                 <a:schemeClr val="tx1"/>
               </a:solidFill>
@@ -11082,88 +11412,11 @@
             </a:endParaRPr>
           </a:p>
           <a:p>
-            <a:pPr marL="0" marR="0" indent="0" algn="l" defTabSz="457200" rtl="0" fontAlgn="auto" latinLnBrk="0" hangingPunct="0">
-              <a:lnSpc>
-                <a:spcPct val="100000"/>
-              </a:lnSpc>
-              <a:spcBef>
-                <a:spcPts val="0"/>
-              </a:spcBef>
-              <a:spcAft>
-                <a:spcPts val="0"/>
-              </a:spcAft>
-              <a:buClrTx/>
-              <a:buSzTx/>
-              <a:buFontTx/>
-              <a:buNone/>
-            </a:pPr>
-            <a:endParaRPr kumimoji="0" lang="pt-BR" sz="2000" b="0" i="0" u="none" strike="noStrike" cap="none" spc="0" normalizeH="0" baseline="0" dirty="0">
-              <a:ln>
-                <a:noFill/>
-              </a:ln>
-              <a:solidFill>
-                <a:srgbClr val="000000"/>
-              </a:solidFill>
-              <a:effectLst/>
-              <a:uFillTx/>
-              <a:latin typeface="+mj-lt"/>
-              <a:ea typeface="+mj-ea"/>
-              <a:cs typeface="+mj-cs"/>
-              <a:sym typeface="Calibri"/>
-            </a:endParaRPr>
-          </a:p>
-        </p:txBody>
-      </p:sp>
-      <p:sp>
-        <p:nvSpPr>
-          <p:cNvPr id="3" name="CaixaDeTexto 2">
-            <a:extLst>
-              <a:ext uri="{FF2B5EF4-FFF2-40B4-BE49-F238E27FC236}">
-                <a16:creationId xmlns:a16="http://schemas.microsoft.com/office/drawing/2014/main" id="{09B598B0-E094-2699-739E-6A07CD5EE4F7}"/>
-              </a:ext>
-            </a:extLst>
-          </p:cNvPr>
-          <p:cNvSpPr txBox="1"/>
-          <p:nvPr/>
-        </p:nvSpPr>
-        <p:spPr>
-          <a:xfrm>
-            <a:off x="148605" y="2907597"/>
-            <a:ext cx="5242142" cy="2554541"/>
-          </a:xfrm>
-          <a:prstGeom prst="rect">
-            <a:avLst/>
-          </a:prstGeom>
-          <a:noFill/>
-          <a:ln w="12700" cap="flat">
-            <a:noFill/>
-            <a:miter lim="400000"/>
-          </a:ln>
-        </p:spPr>
-        <p:style>
-          <a:lnRef idx="0">
-            <a:scrgbClr r="0" g="0" b="0"/>
-          </a:lnRef>
-          <a:fillRef idx="0">
-            <a:scrgbClr r="0" g="0" b="0"/>
-          </a:fillRef>
-          <a:effectRef idx="0">
-            <a:scrgbClr r="0" g="0" b="0"/>
-          </a:effectRef>
-          <a:fontRef idx="none"/>
-        </p:style>
-        <p:txBody>
-          <a:bodyPr rot="0" spcFirstLastPara="1" vertOverflow="overflow" horzOverflow="overflow" vert="horz" wrap="square" lIns="45718" tIns="45718" rIns="45718" bIns="45718" numCol="1" spcCol="38100" rtlCol="0" anchor="t">
-            <a:spAutoFit/>
-          </a:bodyPr>
-          <a:lstStyle/>
-          <a:p>
             <a:pPr marL="457200" indent="-457200" algn="just">
-              <a:buFont typeface="+mj-lt"/>
-              <a:buAutoNum type="arabicPeriod" startAt="7"/>
-            </a:pPr>
-            <a:r>
-              <a:rPr lang="pt-BR" sz="2000" dirty="0">
+              <a:buAutoNum type="arabicPeriod"/>
+            </a:pPr>
+            <a:r>
+              <a:rPr lang="pt-BR" dirty="0">
                 <a:solidFill>
                   <a:schemeClr val="tx1"/>
                 </a:solidFill>
@@ -11175,11 +11428,10 @@
           </a:p>
           <a:p>
             <a:pPr marL="457200" indent="-457200" algn="just">
-              <a:buFont typeface="+mj-lt"/>
-              <a:buAutoNum type="arabicPeriod" startAt="7"/>
-            </a:pPr>
-            <a:r>
-              <a:rPr lang="pt-BR" sz="2000" dirty="0">
+              <a:buAutoNum type="arabicPeriod"/>
+            </a:pPr>
+            <a:r>
+              <a:rPr lang="pt-BR" dirty="0">
                 <a:solidFill>
                   <a:schemeClr val="tx1"/>
                 </a:solidFill>
@@ -11191,11 +11443,10 @@
           </a:p>
           <a:p>
             <a:pPr marL="457200" indent="-457200" algn="just">
-              <a:buFont typeface="+mj-lt"/>
-              <a:buAutoNum type="arabicPeriod" startAt="7"/>
-            </a:pPr>
-            <a:r>
-              <a:rPr lang="pt-BR" sz="2000" dirty="0">
+              <a:buAutoNum type="arabicPeriod"/>
+            </a:pPr>
+            <a:r>
+              <a:rPr lang="pt-BR" dirty="0">
                 <a:solidFill>
                   <a:schemeClr val="tx1"/>
                 </a:solidFill>
@@ -11205,7 +11456,7 @@
               <a:t>Classes (</a:t>
             </a:r>
             <a:r>
-              <a:rPr lang="pt-BR" sz="2000" b="1" dirty="0">
+              <a:rPr lang="pt-BR" b="1" dirty="0">
                 <a:solidFill>
                   <a:srgbClr val="FF0000"/>
                 </a:solidFill>
@@ -11215,7 +11466,7 @@
               <a:t>Orientação a Objetos</a:t>
             </a:r>
             <a:r>
-              <a:rPr lang="pt-BR" sz="2000" dirty="0">
+              <a:rPr lang="pt-BR" dirty="0">
                 <a:solidFill>
                   <a:schemeClr val="tx1"/>
                 </a:solidFill>
@@ -11227,11 +11478,10 @@
           </a:p>
           <a:p>
             <a:pPr marL="457200" indent="-457200" algn="just">
-              <a:buFont typeface="+mj-lt"/>
-              <a:buAutoNum type="arabicPeriod" startAt="7"/>
-            </a:pPr>
-            <a:r>
-              <a:rPr lang="pt-BR" sz="2000" dirty="0">
+              <a:buAutoNum type="arabicPeriod"/>
+            </a:pPr>
+            <a:r>
+              <a:rPr lang="pt-BR" dirty="0">
                 <a:solidFill>
                   <a:schemeClr val="tx1"/>
                 </a:solidFill>
@@ -11241,7 +11491,7 @@
               <a:t>Módulos/Pacotes (</a:t>
             </a:r>
             <a:r>
-              <a:rPr lang="pt-BR" sz="2000" b="1" dirty="0" err="1">
+              <a:rPr lang="pt-BR" b="1" dirty="0" err="1">
                 <a:solidFill>
                   <a:srgbClr val="FF0000"/>
                 </a:solidFill>
@@ -11251,7 +11501,7 @@
               <a:t>import</a:t>
             </a:r>
             <a:r>
-              <a:rPr lang="pt-BR" sz="2000" dirty="0">
+              <a:rPr lang="pt-BR" dirty="0">
                 <a:solidFill>
                   <a:schemeClr val="tx1"/>
                 </a:solidFill>
@@ -11263,11 +11513,10 @@
           </a:p>
           <a:p>
             <a:pPr marL="457200" indent="-457200" algn="just">
-              <a:buFont typeface="+mj-lt"/>
-              <a:buAutoNum type="arabicPeriod" startAt="7"/>
-            </a:pPr>
-            <a:r>
-              <a:rPr lang="pt-BR" sz="2000" dirty="0">
+              <a:buAutoNum type="arabicPeriod"/>
+            </a:pPr>
+            <a:r>
+              <a:rPr lang="pt-BR" dirty="0">
                 <a:solidFill>
                   <a:schemeClr val="tx1"/>
                 </a:solidFill>
@@ -11277,7 +11526,7 @@
               <a:t>Ambientes Virtuais (</a:t>
             </a:r>
             <a:r>
-              <a:rPr lang="pt-BR" sz="2000" b="1" dirty="0">
+              <a:rPr lang="pt-BR" b="1" dirty="0">
                 <a:solidFill>
                   <a:srgbClr val="FF0000"/>
                 </a:solidFill>
@@ -11287,7 +11536,7 @@
               <a:t>Conf. Variáveis, </a:t>
             </a:r>
             <a:r>
-              <a:rPr lang="pt-BR" sz="2000" b="1" dirty="0" err="1">
+              <a:rPr lang="pt-BR" b="1" dirty="0" err="1">
                 <a:solidFill>
                   <a:srgbClr val="FF0000"/>
                 </a:solidFill>
@@ -11297,7 +11546,7 @@
               <a:t>etc</a:t>
             </a:r>
             <a:r>
-              <a:rPr lang="pt-BR" sz="2000" dirty="0">
+              <a:rPr lang="pt-BR" dirty="0">
                 <a:solidFill>
                   <a:schemeClr val="tx1"/>
                 </a:solidFill>
@@ -11309,11 +11558,10 @@
           </a:p>
           <a:p>
             <a:pPr marL="457200" indent="-457200" algn="just">
-              <a:buFont typeface="+mj-lt"/>
-              <a:buAutoNum type="arabicPeriod" startAt="7"/>
-            </a:pPr>
-            <a:r>
-              <a:rPr lang="pt-BR" sz="2000" dirty="0">
+              <a:buAutoNum type="arabicPeriod"/>
+            </a:pPr>
+            <a:r>
+              <a:rPr lang="pt-BR" dirty="0">
                 <a:solidFill>
                   <a:schemeClr val="tx1"/>
                 </a:solidFill>
@@ -11323,7 +11571,7 @@
               <a:t>Erros e Exceções (</a:t>
             </a:r>
             <a:r>
-              <a:rPr lang="pt-BR" sz="2000" b="1" dirty="0" err="1">
+              <a:rPr lang="pt-BR" b="1" dirty="0" err="1">
                 <a:solidFill>
                   <a:srgbClr val="FF0000"/>
                 </a:solidFill>
@@ -11333,7 +11581,7 @@
               <a:t>try</a:t>
             </a:r>
             <a:r>
-              <a:rPr lang="pt-BR" sz="2000" b="1" dirty="0">
+              <a:rPr lang="pt-BR" b="1" dirty="0">
                 <a:solidFill>
                   <a:srgbClr val="FF0000"/>
                 </a:solidFill>
@@ -11343,7 +11591,7 @@
               <a:t>: ... </a:t>
             </a:r>
             <a:r>
-              <a:rPr lang="pt-BR" sz="2000" b="1" dirty="0" err="1">
+              <a:rPr lang="pt-BR" b="1" dirty="0" err="1">
                 <a:solidFill>
                   <a:srgbClr val="FF0000"/>
                 </a:solidFill>
@@ -11353,7 +11601,7 @@
               <a:t>except</a:t>
             </a:r>
             <a:r>
-              <a:rPr lang="pt-BR" sz="2000" b="1" dirty="0">
+              <a:rPr lang="pt-BR" b="1" dirty="0">
                 <a:solidFill>
                   <a:srgbClr val="FF0000"/>
                 </a:solidFill>
@@ -11363,23 +11611,32 @@
               <a:t>:</a:t>
             </a:r>
             <a:r>
-              <a:rPr lang="pt-BR" sz="2000" dirty="0">
+              <a:rPr lang="pt-BR" dirty="0">
+                <a:solidFill>
+                  <a:schemeClr val="tx1"/>
+                </a:solidFill>
+                <a:latin typeface="Times New Roman" panose="02020603050405020304" pitchFamily="18" charset="0"/>
+                <a:cs typeface="Times New Roman" panose="02020603050405020304" pitchFamily="18" charset="0"/>
+              </a:rPr>
+              <a:t>)</a:t>
+            </a:r>
+            <a:r>
+              <a:rPr lang="pt-BR" dirty="0">
                 <a:solidFill>
                   <a:srgbClr val="FF0000"/>
                 </a:solidFill>
                 <a:latin typeface="Times New Roman" panose="02020603050405020304" pitchFamily="18" charset="0"/>
                 <a:cs typeface="Times New Roman" panose="02020603050405020304" pitchFamily="18" charset="0"/>
               </a:rPr>
-              <a:t>)  </a:t>
+              <a:t> </a:t>
             </a:r>
           </a:p>
           <a:p>
             <a:pPr marL="457200" indent="-457200" algn="just">
-              <a:buFont typeface="+mj-lt"/>
-              <a:buAutoNum type="arabicPeriod" startAt="7"/>
-            </a:pPr>
-            <a:r>
-              <a:rPr lang="pt-BR" sz="2000" dirty="0">
+              <a:buAutoNum type="arabicPeriod"/>
+            </a:pPr>
+            <a:r>
+              <a:rPr lang="pt-BR" dirty="0">
                 <a:solidFill>
                   <a:schemeClr val="tx1"/>
                 </a:solidFill>
@@ -11388,24 +11645,7 @@
               </a:rPr>
               <a:t>Conexão com Banco de Dados</a:t>
             </a:r>
-          </a:p>
-          <a:p>
-            <a:pPr marL="0" marR="0" indent="0" algn="l" defTabSz="457200" rtl="0" fontAlgn="auto" latinLnBrk="0" hangingPunct="0">
-              <a:lnSpc>
-                <a:spcPct val="100000"/>
-              </a:lnSpc>
-              <a:spcBef>
-                <a:spcPts val="0"/>
-              </a:spcBef>
-              <a:spcAft>
-                <a:spcPts val="0"/>
-              </a:spcAft>
-              <a:buClrTx/>
-              <a:buSzTx/>
-              <a:buFontTx/>
-              <a:buNone/>
-            </a:pPr>
-            <a:endParaRPr kumimoji="0" lang="pt-BR" sz="2000" b="0" i="0" u="none" strike="noStrike" cap="none" spc="0" normalizeH="0" baseline="0" dirty="0">
+            <a:endParaRPr kumimoji="0" lang="pt-BR" b="0" i="0" u="none" strike="noStrike" cap="none" spc="0" normalizeH="0" baseline="0" dirty="0">
               <a:ln>
                 <a:noFill/>
               </a:ln>
@@ -15605,7 +15845,7 @@
               <a:t># </a:t>
             </a:r>
             <a:r>
-              <a:rPr lang="pt-BR" dirty="0" err="1">
+              <a:rPr lang="pt-BR" b="1" dirty="0" err="1">
                 <a:solidFill>
                   <a:schemeClr val="tx1"/>
                 </a:solidFill>
@@ -15615,7 +15855,7 @@
               <a:t>To</a:t>
             </a:r>
             <a:r>
-              <a:rPr lang="pt-BR" dirty="0">
+              <a:rPr lang="pt-BR" b="1" dirty="0">
                 <a:solidFill>
                   <a:schemeClr val="tx1"/>
                 </a:solidFill>
@@ -15625,7 +15865,7 @@
               <a:t> take inputs </a:t>
             </a:r>
             <a:r>
-              <a:rPr lang="pt-BR" dirty="0" err="1">
+              <a:rPr lang="pt-BR" b="1" dirty="0" err="1">
                 <a:solidFill>
                   <a:schemeClr val="tx1"/>
                 </a:solidFill>
@@ -15635,7 +15875,7 @@
               <a:t>from</a:t>
             </a:r>
             <a:r>
-              <a:rPr lang="pt-BR" dirty="0">
+              <a:rPr lang="pt-BR" b="1" dirty="0">
                 <a:solidFill>
                   <a:schemeClr val="tx1"/>
                 </a:solidFill>
@@ -15645,7 +15885,7 @@
               <a:t> </a:t>
             </a:r>
             <a:r>
-              <a:rPr lang="pt-BR" dirty="0" err="1">
+              <a:rPr lang="pt-BR" b="1" dirty="0" err="1">
                 <a:solidFill>
                   <a:schemeClr val="tx1"/>
                 </a:solidFill>
@@ -15655,7 +15895,7 @@
               <a:t>the</a:t>
             </a:r>
             <a:r>
-              <a:rPr lang="pt-BR" dirty="0">
+              <a:rPr lang="pt-BR" b="1" dirty="0">
                 <a:solidFill>
                   <a:schemeClr val="tx1"/>
                 </a:solidFill>
@@ -15665,7 +15905,7 @@
               <a:t> </a:t>
             </a:r>
             <a:r>
-              <a:rPr lang="pt-BR" dirty="0" err="1">
+              <a:rPr lang="pt-BR" b="1" dirty="0" err="1">
                 <a:solidFill>
                   <a:schemeClr val="tx1"/>
                 </a:solidFill>
@@ -15674,7 +15914,7 @@
               </a:rPr>
               <a:t>user</a:t>
             </a:r>
-            <a:endParaRPr lang="pt-BR" dirty="0">
+            <a:endParaRPr lang="pt-BR" b="1" dirty="0">
               <a:solidFill>
                 <a:schemeClr val="tx1"/>
               </a:solidFill>
@@ -15694,7 +15934,7 @@
                 <a:latin typeface="Times New Roman" panose="02020603050405020304" pitchFamily="18" charset="0"/>
                 <a:cs typeface="Times New Roman" panose="02020603050405020304" pitchFamily="18" charset="0"/>
               </a:rPr>
-              <a:t># x = input('</a:t>
+              <a:t>x = input('</a:t>
             </a:r>
             <a:r>
               <a:rPr lang="pt-BR" dirty="0" err="1">
@@ -15754,7 +15994,7 @@
                 <a:latin typeface="Times New Roman" panose="02020603050405020304" pitchFamily="18" charset="0"/>
                 <a:cs typeface="Times New Roman" panose="02020603050405020304" pitchFamily="18" charset="0"/>
               </a:rPr>
-              <a:t> x: ‘)</a:t>
+              <a:t> x: ')</a:t>
             </a:r>
           </a:p>
           <a:p>
@@ -15769,7 +16009,7 @@
                 <a:latin typeface="Times New Roman" panose="02020603050405020304" pitchFamily="18" charset="0"/>
                 <a:cs typeface="Times New Roman" panose="02020603050405020304" pitchFamily="18" charset="0"/>
               </a:rPr>
-              <a:t># y = input('</a:t>
+              <a:t>y = input('</a:t>
             </a:r>
             <a:r>
               <a:rPr lang="pt-BR" dirty="0" err="1">

</xml_diff>